<commit_message>
ISS-40: Add processing solid fill
</commit_message>
<xml_diff>
--- a/src/SlideDotNet.Tests/Resource/009.pptx
+++ b/src/SlideDotNet.Tests/Resource/009.pptx
@@ -8206,7 +8206,7 @@
           <a:graphicData uri="http://schemas.openxmlformats.org/presentationml/2006/ole">
             <mc:AlternateContent xmlns:mc="http://schemas.openxmlformats.org/markup-compatibility/2006">
               <mc:Choice xmlns:v="urn:schemas-microsoft-com:vml" Requires="v">
-                <p:oleObj spid="_x0000_s1078" name="Document" r:id="rId4" imgW="5940848" imgH="323743" progId="Word.Document.12">
+                <p:oleObj spid="_x0000_s1080" name="Document" r:id="rId4" imgW="5940848" imgH="323743" progId="Word.Document.12">
                   <p:embed/>
                 </p:oleObj>
               </mc:Choice>
@@ -8311,7 +8311,7 @@
           <a:graphicData uri="http://schemas.openxmlformats.org/presentationml/2006/ole">
             <mc:AlternateContent xmlns:mc="http://schemas.openxmlformats.org/markup-compatibility/2006">
               <mc:Choice xmlns:v="urn:schemas-microsoft-com:vml" Requires="v">
-                <p:oleObj spid="_x0000_s1079" name="Packager Shell Object" showAsIcon="1" r:id="rId6" imgW="485640" imgH="372960" progId="Package">
+                <p:oleObj spid="_x0000_s1081" name="Packager Shell Object" showAsIcon="1" r:id="rId6" imgW="485640" imgH="372960" progId="Package">
                   <p:embed/>
                 </p:oleObj>
               </mc:Choice>
@@ -8352,6 +8352,55 @@
           </a:graphicData>
         </a:graphic>
       </p:graphicFrame>
+      <p:sp>
+        <p:nvSpPr>
+          <p:cNvPr id="2" name="Прямоугольник 1">
+            <a:extLst>
+              <a:ext uri="{FF2B5EF4-FFF2-40B4-BE49-F238E27FC236}">
+                <a16:creationId xmlns:a16="http://schemas.microsoft.com/office/drawing/2014/main" id="{891A7877-3F54-4F61-9524-20CD83E1FABD}"/>
+              </a:ext>
+            </a:extLst>
+          </p:cNvPr>
+          <p:cNvSpPr/>
+          <p:nvPr/>
+        </p:nvSpPr>
+        <p:spPr>
+          <a:xfrm>
+            <a:off x="6007894" y="2871788"/>
+            <a:ext cx="1064419" cy="785812"/>
+          </a:xfrm>
+          <a:prstGeom prst="rect">
+            <a:avLst/>
+          </a:prstGeom>
+          <a:solidFill>
+            <a:srgbClr val="FF0000"/>
+          </a:solidFill>
+        </p:spPr>
+        <p:style>
+          <a:lnRef idx="2">
+            <a:schemeClr val="accent1">
+              <a:shade val="50000"/>
+            </a:schemeClr>
+          </a:lnRef>
+          <a:fillRef idx="1">
+            <a:schemeClr val="accent1"/>
+          </a:fillRef>
+          <a:effectRef idx="0">
+            <a:schemeClr val="accent1"/>
+          </a:effectRef>
+          <a:fontRef idx="minor">
+            <a:schemeClr val="lt1"/>
+          </a:fontRef>
+        </p:style>
+        <p:txBody>
+          <a:bodyPr rtlCol="0" anchor="ctr"/>
+          <a:lstStyle/>
+          <a:p>
+            <a:pPr algn="ctr"/>
+            <a:endParaRPr lang="ru-UA" dirty="0"/>
+          </a:p>
+        </p:txBody>
+      </p:sp>
     </p:spTree>
     <p:extLst>
       <p:ext uri="{BB962C8B-B14F-4D97-AF65-F5344CB8AC3E}">

</xml_diff>